<commit_message>
PDF-Version der Praesentation hinzugefuegt
</commit_message>
<xml_diff>
--- a/Presentation/Presentation.pptx
+++ b/Presentation/Presentation.pptx
@@ -14,6 +14,7 @@
     <p:sldId id="262" r:id="rId8"/>
     <p:sldId id="263" r:id="rId9"/>
     <p:sldId id="264" r:id="rId10"/>
+    <p:sldId id="265" r:id="rId11"/>
   </p:sldIdLst>
   <p:sldSz cx="9144000" cy="6858000" type="screen4x3"/>
   <p:notesSz cx="6858000" cy="9144000"/>
@@ -296,6 +297,7 @@
           <a:p>
             <a:fld id="{E3E03A12-5536-9444-BBB3-8D441CE39243}" type="datetimeFigureOut">
               <a:rPr lang="de-DE" smtClean="0"/>
+              <a:pPr/>
               <a:t>1/17/10</a:t>
             </a:fld>
             <a:endParaRPr lang="de-DE"/>
@@ -338,6 +340,7 @@
           <a:p>
             <a:fld id="{822C6526-016E-DB46-8DDB-1090AEE60C10}" type="slidenum">
               <a:rPr lang="de-DE" smtClean="0"/>
+              <a:pPr/>
               <a:t>‹#›</a:t>
             </a:fld>
             <a:endParaRPr lang="de-DE"/>
@@ -461,6 +464,7 @@
           <a:p>
             <a:fld id="{E3E03A12-5536-9444-BBB3-8D441CE39243}" type="datetimeFigureOut">
               <a:rPr lang="de-DE" smtClean="0"/>
+              <a:pPr/>
               <a:t>1/17/10</a:t>
             </a:fld>
             <a:endParaRPr lang="de-DE"/>
@@ -503,6 +507,7 @@
           <a:p>
             <a:fld id="{822C6526-016E-DB46-8DDB-1090AEE60C10}" type="slidenum">
               <a:rPr lang="de-DE" smtClean="0"/>
+              <a:pPr/>
               <a:t>‹#›</a:t>
             </a:fld>
             <a:endParaRPr lang="de-DE"/>
@@ -636,6 +641,7 @@
           <a:p>
             <a:fld id="{E3E03A12-5536-9444-BBB3-8D441CE39243}" type="datetimeFigureOut">
               <a:rPr lang="de-DE" smtClean="0"/>
+              <a:pPr/>
               <a:t>1/17/10</a:t>
             </a:fld>
             <a:endParaRPr lang="de-DE"/>
@@ -678,6 +684,7 @@
           <a:p>
             <a:fld id="{822C6526-016E-DB46-8DDB-1090AEE60C10}" type="slidenum">
               <a:rPr lang="de-DE" smtClean="0"/>
+              <a:pPr/>
               <a:t>‹#›</a:t>
             </a:fld>
             <a:endParaRPr lang="de-DE"/>
@@ -801,6 +808,7 @@
           <a:p>
             <a:fld id="{E3E03A12-5536-9444-BBB3-8D441CE39243}" type="datetimeFigureOut">
               <a:rPr lang="de-DE" smtClean="0"/>
+              <a:pPr/>
               <a:t>1/17/10</a:t>
             </a:fld>
             <a:endParaRPr lang="de-DE"/>
@@ -843,6 +851,7 @@
           <a:p>
             <a:fld id="{822C6526-016E-DB46-8DDB-1090AEE60C10}" type="slidenum">
               <a:rPr lang="de-DE" smtClean="0"/>
+              <a:pPr/>
               <a:t>‹#›</a:t>
             </a:fld>
             <a:endParaRPr lang="de-DE"/>
@@ -1042,6 +1051,7 @@
           <a:p>
             <a:fld id="{E3E03A12-5536-9444-BBB3-8D441CE39243}" type="datetimeFigureOut">
               <a:rPr lang="de-DE" smtClean="0"/>
+              <a:pPr/>
               <a:t>1/17/10</a:t>
             </a:fld>
             <a:endParaRPr lang="de-DE"/>
@@ -1084,6 +1094,7 @@
           <a:p>
             <a:fld id="{822C6526-016E-DB46-8DDB-1090AEE60C10}" type="slidenum">
               <a:rPr lang="de-DE" smtClean="0"/>
+              <a:pPr/>
               <a:t>‹#›</a:t>
             </a:fld>
             <a:endParaRPr lang="de-DE"/>
@@ -1325,6 +1336,7 @@
           <a:p>
             <a:fld id="{E3E03A12-5536-9444-BBB3-8D441CE39243}" type="datetimeFigureOut">
               <a:rPr lang="de-DE" smtClean="0"/>
+              <a:pPr/>
               <a:t>1/17/10</a:t>
             </a:fld>
             <a:endParaRPr lang="de-DE"/>
@@ -1367,6 +1379,7 @@
           <a:p>
             <a:fld id="{822C6526-016E-DB46-8DDB-1090AEE60C10}" type="slidenum">
               <a:rPr lang="de-DE" smtClean="0"/>
+              <a:pPr/>
               <a:t>‹#›</a:t>
             </a:fld>
             <a:endParaRPr lang="de-DE"/>
@@ -1742,6 +1755,7 @@
           <a:p>
             <a:fld id="{E3E03A12-5536-9444-BBB3-8D441CE39243}" type="datetimeFigureOut">
               <a:rPr lang="de-DE" smtClean="0"/>
+              <a:pPr/>
               <a:t>1/17/10</a:t>
             </a:fld>
             <a:endParaRPr lang="de-DE"/>
@@ -1784,6 +1798,7 @@
           <a:p>
             <a:fld id="{822C6526-016E-DB46-8DDB-1090AEE60C10}" type="slidenum">
               <a:rPr lang="de-DE" smtClean="0"/>
+              <a:pPr/>
               <a:t>‹#›</a:t>
             </a:fld>
             <a:endParaRPr lang="de-DE"/>
@@ -1855,6 +1870,7 @@
           <a:p>
             <a:fld id="{E3E03A12-5536-9444-BBB3-8D441CE39243}" type="datetimeFigureOut">
               <a:rPr lang="de-DE" smtClean="0"/>
+              <a:pPr/>
               <a:t>1/17/10</a:t>
             </a:fld>
             <a:endParaRPr lang="de-DE"/>
@@ -1897,6 +1913,7 @@
           <a:p>
             <a:fld id="{822C6526-016E-DB46-8DDB-1090AEE60C10}" type="slidenum">
               <a:rPr lang="de-DE" smtClean="0"/>
+              <a:pPr/>
               <a:t>‹#›</a:t>
             </a:fld>
             <a:endParaRPr lang="de-DE"/>
@@ -1945,6 +1962,7 @@
           <a:p>
             <a:fld id="{E3E03A12-5536-9444-BBB3-8D441CE39243}" type="datetimeFigureOut">
               <a:rPr lang="de-DE" smtClean="0"/>
+              <a:pPr/>
               <a:t>1/17/10</a:t>
             </a:fld>
             <a:endParaRPr lang="de-DE"/>
@@ -1987,6 +2005,7 @@
           <a:p>
             <a:fld id="{822C6526-016E-DB46-8DDB-1090AEE60C10}" type="slidenum">
               <a:rPr lang="de-DE" smtClean="0"/>
+              <a:pPr/>
               <a:t>‹#›</a:t>
             </a:fld>
             <a:endParaRPr lang="de-DE"/>
@@ -2217,6 +2236,7 @@
           <a:p>
             <a:fld id="{E3E03A12-5536-9444-BBB3-8D441CE39243}" type="datetimeFigureOut">
               <a:rPr lang="de-DE" smtClean="0"/>
+              <a:pPr/>
               <a:t>1/17/10</a:t>
             </a:fld>
             <a:endParaRPr lang="de-DE"/>
@@ -2259,6 +2279,7 @@
           <a:p>
             <a:fld id="{822C6526-016E-DB46-8DDB-1090AEE60C10}" type="slidenum">
               <a:rPr lang="de-DE" smtClean="0"/>
+              <a:pPr/>
               <a:t>‹#›</a:t>
             </a:fld>
             <a:endParaRPr lang="de-DE"/>
@@ -2465,6 +2486,7 @@
           <a:p>
             <a:fld id="{E3E03A12-5536-9444-BBB3-8D441CE39243}" type="datetimeFigureOut">
               <a:rPr lang="de-DE" smtClean="0"/>
+              <a:pPr/>
               <a:t>1/17/10</a:t>
             </a:fld>
             <a:endParaRPr lang="de-DE"/>
@@ -2507,6 +2529,7 @@
           <a:p>
             <a:fld id="{822C6526-016E-DB46-8DDB-1090AEE60C10}" type="slidenum">
               <a:rPr lang="de-DE" smtClean="0"/>
+              <a:pPr/>
               <a:t>‹#›</a:t>
             </a:fld>
             <a:endParaRPr lang="de-DE"/>
@@ -2673,6 +2696,7 @@
           <a:p>
             <a:fld id="{E3E03A12-5536-9444-BBB3-8D441CE39243}" type="datetimeFigureOut">
               <a:rPr lang="de-DE" smtClean="0"/>
+              <a:pPr/>
               <a:t>1/17/10</a:t>
             </a:fld>
             <a:endParaRPr lang="de-DE"/>
@@ -2751,6 +2775,7 @@
           <a:p>
             <a:fld id="{822C6526-016E-DB46-8DDB-1090AEE60C10}" type="slidenum">
               <a:rPr lang="de-DE" smtClean="0"/>
+              <a:pPr/>
               <a:t>‹#›</a:t>
             </a:fld>
             <a:endParaRPr lang="de-DE"/>
@@ -3534,6 +3559,72 @@
 </p:sld>
 </file>
 
+<file path=ppt/slides/slide10.xml><?xml version="1.0" encoding="utf-8"?>
+<p:sld xmlns:a="http://schemas.openxmlformats.org/drawingml/2006/main" xmlns:r="http://schemas.openxmlformats.org/officeDocument/2006/relationships" xmlns:mc="http://schemas.openxmlformats.org/markup-compatibility/2006" xmlns:mv="urn:schemas-microsoft-com:mac:vml" xmlns:p="http://schemas.openxmlformats.org/presentationml/2006/main" mc:Ignorable="mv" mc:PreserveAttributes="mv:*">
+  <p:cSld>
+    <p:spTree>
+      <p:nvGrpSpPr>
+        <p:cNvPr id="1" name=""/>
+        <p:cNvGrpSpPr/>
+        <p:nvPr/>
+      </p:nvGrpSpPr>
+      <p:grpSpPr>
+        <a:xfrm>
+          <a:off x="0" y="0"/>
+          <a:ext cx="0" cy="0"/>
+          <a:chOff x="0" y="0"/>
+          <a:chExt cx="0" cy="0"/>
+        </a:xfrm>
+      </p:grpSpPr>
+      <p:sp>
+        <p:nvSpPr>
+          <p:cNvPr id="2" name="Title 1"/>
+          <p:cNvSpPr>
+            <a:spLocks noGrp="1"/>
+          </p:cNvSpPr>
+          <p:nvPr>
+            <p:ph type="title"/>
+          </p:nvPr>
+        </p:nvSpPr>
+        <p:spPr/>
+        <p:txBody>
+          <a:bodyPr/>
+          <a:lstStyle/>
+          <a:p>
+            <a:endParaRPr lang="de-DE"/>
+          </a:p>
+        </p:txBody>
+      </p:sp>
+      <p:sp>
+        <p:nvSpPr>
+          <p:cNvPr id="3" name="Content Placeholder 2"/>
+          <p:cNvSpPr>
+            <a:spLocks noGrp="1"/>
+          </p:cNvSpPr>
+          <p:nvPr>
+            <p:ph idx="1"/>
+          </p:nvPr>
+        </p:nvSpPr>
+        <p:spPr/>
+        <p:txBody>
+          <a:bodyPr/>
+          <a:lstStyle/>
+          <a:p>
+            <a:r>
+              <a:rPr lang="de-DE"/>
+              <a:t>Beispiele, Erläuterungen hier...</a:t>
+            </a:r>
+          </a:p>
+        </p:txBody>
+      </p:sp>
+    </p:spTree>
+  </p:cSld>
+  <p:clrMapOvr>
+    <a:masterClrMapping/>
+  </p:clrMapOvr>
+</p:sld>
+</file>
+
 <file path=ppt/slides/slide2.xml><?xml version="1.0" encoding="utf-8"?>
 <p:sld xmlns:a="http://schemas.openxmlformats.org/drawingml/2006/main" xmlns:r="http://schemas.openxmlformats.org/officeDocument/2006/relationships" xmlns:mc="http://schemas.openxmlformats.org/markup-compatibility/2006" xmlns:mv="urn:schemas-microsoft-com:mac:vml" xmlns:p="http://schemas.openxmlformats.org/presentationml/2006/main" mc:Ignorable="mv" mc:PreserveAttributes="mv:*">
   <p:cSld>
@@ -3647,15 +3738,7 @@
             </a:r>
             <a:r>
               <a:rPr lang="en-US" smtClean="0"/>
-              <a:t> einer </a:t>
-            </a:r>
-            <a:r>
-              <a:rPr lang="en-US" smtClean="0"/>
-              <a:t>künstlichen Gesellschaft, (Artificial Society) </a:t>
-            </a:r>
-            <a:r>
-              <a:rPr lang="en-US" smtClean="0"/>
-              <a:t>unter </a:t>
+              <a:t> einer künstlichen Gesellschaft, (Artificial Society) unter </a:t>
             </a:r>
             <a:r>
               <a:rPr lang="en-US" dirty="0" err="1"/>
@@ -5437,7 +5520,6 @@
               <a:rPr lang="de-DE" smtClean="0"/>
               <a:t>mindestens eine leere Parzelle in der Nähe ist,</a:t>
             </a:r>
-            <a:endParaRPr lang="de-DE" smtClean="0"/>
           </a:p>
           <a:p>
             <a:pPr lvl="1"/>
@@ -5450,13 +5532,8 @@
             <a:pPr lvl="2"/>
             <a:r>
               <a:rPr lang="de-DE" smtClean="0"/>
-              <a:t>wird ein Kind geboren</a:t>
-            </a:r>
-            <a:r>
-              <a:rPr lang="de-DE" smtClean="0"/>
-              <a:t>, dessen initiale Zuckermenge jeweils die Hälfte der Zuckermenge des Vaters und der Mutter, welche sie selbst zur Geburt bekommen haben, entspricht.</a:t>
-            </a:r>
-            <a:endParaRPr lang="de-DE" smtClean="0"/>
+              <a:t>wird ein Kind geboren, dessen initiale Zuckermenge jeweils die Hälfte der Zuckermenge des Vaters und der Mutter, welche sie selbst zur Geburt bekommen haben, entspricht.</a:t>
+            </a:r>
           </a:p>
         </p:txBody>
       </p:sp>

</xml_diff>

<commit_message>
Animation zur Praesentation hinzugefuegt
</commit_message>
<xml_diff>
--- a/Presentation/Presentation.pptx
+++ b/Presentation/Presentation.pptx
@@ -12,7 +12,7 @@
     <p:sldId id="261" r:id="rId6"/>
     <p:sldId id="260" r:id="rId7"/>
     <p:sldId id="262" r:id="rId8"/>
-    <p:sldId id="263" r:id="rId9"/>
+    <p:sldId id="267" r:id="rId9"/>
     <p:sldId id="264" r:id="rId10"/>
     <p:sldId id="265" r:id="rId11"/>
   </p:sldIdLst>
@@ -1761,6 +1761,13 @@
         </dgm:presLayoutVars>
       </dgm:prSet>
       <dgm:spPr/>
+      <dgm:t>
+        <a:bodyPr/>
+        <a:lstStyle/>
+        <a:p>
+          <a:endParaRPr lang="en-US"/>
+        </a:p>
+      </dgm:t>
     </dgm:pt>
     <dgm:pt modelId="{1644EE96-CB53-4E47-A4D6-3E838BFEF211}" type="pres">
       <dgm:prSet presAssocID="{93F285CF-03E6-AD4B-853E-A595FCAE3461}" presName="spVertical2" presStyleCnt="0"/>
@@ -1791,6 +1798,13 @@
         </dgm:presLayoutVars>
       </dgm:prSet>
       <dgm:spPr/>
+      <dgm:t>
+        <a:bodyPr/>
+        <a:lstStyle/>
+        <a:p>
+          <a:endParaRPr lang="en-US"/>
+        </a:p>
+      </dgm:t>
     </dgm:pt>
     <dgm:pt modelId="{C1B6E88E-6B0E-9D4C-A945-B61814D7B3E4}" type="pres">
       <dgm:prSet presAssocID="{DF9BB8C1-1F1C-224E-A7B3-379786AD8D88}" presName="spVertical2" presStyleCnt="0"/>
@@ -1821,6 +1835,13 @@
         </dgm:presLayoutVars>
       </dgm:prSet>
       <dgm:spPr/>
+      <dgm:t>
+        <a:bodyPr/>
+        <a:lstStyle/>
+        <a:p>
+          <a:endParaRPr lang="en-US"/>
+        </a:p>
+      </dgm:t>
     </dgm:pt>
     <dgm:pt modelId="{BBDD72CA-A800-3C4E-AEB9-7D8ED8099303}" type="pres">
       <dgm:prSet presAssocID="{CDF87145-9BD6-AA43-A385-6B3FC8E2E595}" presName="spVertical2" presStyleCnt="0"/>
@@ -1845,35 +1866,35 @@
   </dgm:ptLst>
   <dgm:cxnLst>
     <dgm:cxn modelId="{2B7FC5DE-6462-3E46-8C90-CA5B36600B91}" srcId="{EF77BCA7-5424-DE49-B0AC-9945DDFA1F96}" destId="{DF9BB8C1-1F1C-224E-A7B3-379786AD8D88}" srcOrd="1" destOrd="0" parTransId="{D8681E15-33F3-894E-B538-902536B742AB}" sibTransId="{AD34FC3B-627D-7B45-8255-4705A2F94613}"/>
-    <dgm:cxn modelId="{DDC5D79E-21CD-9F4E-9CE1-84845EEC5C69}" type="presOf" srcId="{CDF87145-9BD6-AA43-A385-6B3FC8E2E595}" destId="{FD3E8E6F-A2FE-BA4D-9042-7E40F126C35D}" srcOrd="0" destOrd="0" presId="urn:microsoft.com/office/officeart/2005/8/layout/hProcess3"/>
+    <dgm:cxn modelId="{FFC0A126-AD95-2F47-BCE0-658607D512E7}" type="presOf" srcId="{EF77BCA7-5424-DE49-B0AC-9945DDFA1F96}" destId="{C41437E7-93E2-4244-B5BB-0FB5398F019C}" srcOrd="0" destOrd="0" presId="urn:microsoft.com/office/officeart/2005/8/layout/hProcess3"/>
     <dgm:cxn modelId="{FFDAD881-9FCB-DC4F-9718-82BB75C984E6}" srcId="{EF77BCA7-5424-DE49-B0AC-9945DDFA1F96}" destId="{93F285CF-03E6-AD4B-853E-A595FCAE3461}" srcOrd="0" destOrd="0" parTransId="{B9EAAB2C-25B3-B544-8AD3-84F0188CE7EA}" sibTransId="{0E919826-9498-E84E-ADB9-D5C5DF3970D2}"/>
     <dgm:cxn modelId="{2EA4EB31-FFF7-2645-B9F7-90B822F3212D}" srcId="{EF77BCA7-5424-DE49-B0AC-9945DDFA1F96}" destId="{CDF87145-9BD6-AA43-A385-6B3FC8E2E595}" srcOrd="2" destOrd="0" parTransId="{23725B13-96A4-6841-8E75-66E248CACD60}" sibTransId="{69C37F7B-9BEC-9945-8567-D84A36F4C024}"/>
-    <dgm:cxn modelId="{C50F61B6-C9C0-CE49-AF3A-58F013F276E6}" type="presOf" srcId="{EF77BCA7-5424-DE49-B0AC-9945DDFA1F96}" destId="{C41437E7-93E2-4244-B5BB-0FB5398F019C}" srcOrd="0" destOrd="0" presId="urn:microsoft.com/office/officeart/2005/8/layout/hProcess3"/>
-    <dgm:cxn modelId="{BE9734E2-AC7D-984F-8C28-66061E2C78C6}" type="presOf" srcId="{93F285CF-03E6-AD4B-853E-A595FCAE3461}" destId="{A44B373F-200A-A449-9070-36D615C6E73F}" srcOrd="0" destOrd="0" presId="urn:microsoft.com/office/officeart/2005/8/layout/hProcess3"/>
-    <dgm:cxn modelId="{57205DD8-FE51-E544-A3D4-B3F9E8E0D3DB}" type="presOf" srcId="{DF9BB8C1-1F1C-224E-A7B3-379786AD8D88}" destId="{E728272B-8270-384A-BDBE-2F1D493CE380}" srcOrd="0" destOrd="0" presId="urn:microsoft.com/office/officeart/2005/8/layout/hProcess3"/>
-    <dgm:cxn modelId="{9C01AFAC-3A34-4942-964D-5C0CD05CE3C0}" type="presParOf" srcId="{C41437E7-93E2-4244-B5BB-0FB5398F019C}" destId="{7F2907E2-3063-1443-AB50-12B66C60971A}" srcOrd="0" destOrd="0" presId="urn:microsoft.com/office/officeart/2005/8/layout/hProcess3"/>
-    <dgm:cxn modelId="{6C6C5610-4281-E746-BC49-3AE744C19F84}" type="presParOf" srcId="{C41437E7-93E2-4244-B5BB-0FB5398F019C}" destId="{03E188D3-1B92-D447-BC0F-BC0FAF8DE632}" srcOrd="1" destOrd="0" presId="urn:microsoft.com/office/officeart/2005/8/layout/hProcess3"/>
-    <dgm:cxn modelId="{6946FF37-A090-B34F-AE66-D78C598C16EC}" type="presParOf" srcId="{03E188D3-1B92-D447-BC0F-BC0FAF8DE632}" destId="{05333B6A-9875-D448-B250-0C1A5B147700}" srcOrd="0" destOrd="0" presId="urn:microsoft.com/office/officeart/2005/8/layout/hProcess3"/>
-    <dgm:cxn modelId="{1884813E-7EA1-8048-9463-E9308767E8B5}" type="presParOf" srcId="{03E188D3-1B92-D447-BC0F-BC0FAF8DE632}" destId="{C28D6342-D723-B649-AC00-0BF95E0A261C}" srcOrd="1" destOrd="0" presId="urn:microsoft.com/office/officeart/2005/8/layout/hProcess3"/>
-    <dgm:cxn modelId="{79F85D1A-F552-F045-A6A2-E55B25DE348A}" type="presParOf" srcId="{C28D6342-D723-B649-AC00-0BF95E0A261C}" destId="{4715F7C2-FBCA-5E46-A880-7AE556CC1184}" srcOrd="0" destOrd="0" presId="urn:microsoft.com/office/officeart/2005/8/layout/hProcess3"/>
-    <dgm:cxn modelId="{887246F5-97D0-7942-A22A-BE08ABE7FB73}" type="presParOf" srcId="{C28D6342-D723-B649-AC00-0BF95E0A261C}" destId="{A44B373F-200A-A449-9070-36D615C6E73F}" srcOrd="1" destOrd="0" presId="urn:microsoft.com/office/officeart/2005/8/layout/hProcess3"/>
-    <dgm:cxn modelId="{CF01A33B-26EC-D74E-B723-BF34D704E4B9}" type="presParOf" srcId="{C28D6342-D723-B649-AC00-0BF95E0A261C}" destId="{1644EE96-CB53-4E47-A4D6-3E838BFEF211}" srcOrd="2" destOrd="0" presId="urn:microsoft.com/office/officeart/2005/8/layout/hProcess3"/>
-    <dgm:cxn modelId="{08D4ACBA-B540-844F-A649-8C3C5C922B7C}" type="presParOf" srcId="{C28D6342-D723-B649-AC00-0BF95E0A261C}" destId="{C1250A9D-0DDF-374D-B56B-F6622476C094}" srcOrd="3" destOrd="0" presId="urn:microsoft.com/office/officeart/2005/8/layout/hProcess3"/>
-    <dgm:cxn modelId="{F09BE991-75BD-CF45-B0D3-7E8615A7DAC2}" type="presParOf" srcId="{03E188D3-1B92-D447-BC0F-BC0FAF8DE632}" destId="{15B03E35-36EB-174B-BAB7-5B2867514C24}" srcOrd="2" destOrd="0" presId="urn:microsoft.com/office/officeart/2005/8/layout/hProcess3"/>
-    <dgm:cxn modelId="{B9C36888-6422-BB45-B617-DB13492284EE}" type="presParOf" srcId="{03E188D3-1B92-D447-BC0F-BC0FAF8DE632}" destId="{E7CDCF20-C218-BD43-80FA-CBDB6D07A4D0}" srcOrd="3" destOrd="0" presId="urn:microsoft.com/office/officeart/2005/8/layout/hProcess3"/>
-    <dgm:cxn modelId="{7A2C7D6C-5938-3849-90C0-1DC4C642FD1D}" type="presParOf" srcId="{E7CDCF20-C218-BD43-80FA-CBDB6D07A4D0}" destId="{EFC2AC89-EE3A-F345-8BF3-DC263DDF0E67}" srcOrd="0" destOrd="0" presId="urn:microsoft.com/office/officeart/2005/8/layout/hProcess3"/>
-    <dgm:cxn modelId="{A7597109-7BEF-E243-90B4-1E0099DDEF5C}" type="presParOf" srcId="{E7CDCF20-C218-BD43-80FA-CBDB6D07A4D0}" destId="{E728272B-8270-384A-BDBE-2F1D493CE380}" srcOrd="1" destOrd="0" presId="urn:microsoft.com/office/officeart/2005/8/layout/hProcess3"/>
-    <dgm:cxn modelId="{C0A56059-C447-154F-93A9-18955CA959C6}" type="presParOf" srcId="{E7CDCF20-C218-BD43-80FA-CBDB6D07A4D0}" destId="{C1B6E88E-6B0E-9D4C-A945-B61814D7B3E4}" srcOrd="2" destOrd="0" presId="urn:microsoft.com/office/officeart/2005/8/layout/hProcess3"/>
-    <dgm:cxn modelId="{89D4D10A-2D26-5946-B778-EF481ABCF8B8}" type="presParOf" srcId="{E7CDCF20-C218-BD43-80FA-CBDB6D07A4D0}" destId="{DA662F93-194F-254D-9B1A-70E4E25DF4F2}" srcOrd="3" destOrd="0" presId="urn:microsoft.com/office/officeart/2005/8/layout/hProcess3"/>
-    <dgm:cxn modelId="{B98754C3-C9D8-D849-9090-4AFDA417462C}" type="presParOf" srcId="{03E188D3-1B92-D447-BC0F-BC0FAF8DE632}" destId="{C52DBBF3-07D9-8A43-A15E-39B020B7115B}" srcOrd="4" destOrd="0" presId="urn:microsoft.com/office/officeart/2005/8/layout/hProcess3"/>
-    <dgm:cxn modelId="{2DD0B001-9CAB-894A-A5C7-81D0B89BA11B}" type="presParOf" srcId="{03E188D3-1B92-D447-BC0F-BC0FAF8DE632}" destId="{60DBA832-479C-1743-BECC-250F728DC167}" srcOrd="5" destOrd="0" presId="urn:microsoft.com/office/officeart/2005/8/layout/hProcess3"/>
-    <dgm:cxn modelId="{56CA8084-F794-5842-96C9-423EDC402E73}" type="presParOf" srcId="{60DBA832-479C-1743-BECC-250F728DC167}" destId="{AB5EE344-C418-7C40-8127-F20F97FF7CB4}" srcOrd="0" destOrd="0" presId="urn:microsoft.com/office/officeart/2005/8/layout/hProcess3"/>
-    <dgm:cxn modelId="{8EA0FAB0-1BAC-0E4B-80EA-A2AF2F799030}" type="presParOf" srcId="{60DBA832-479C-1743-BECC-250F728DC167}" destId="{FD3E8E6F-A2FE-BA4D-9042-7E40F126C35D}" srcOrd="1" destOrd="0" presId="urn:microsoft.com/office/officeart/2005/8/layout/hProcess3"/>
-    <dgm:cxn modelId="{BD4E6ACF-7234-BD40-B298-F60FE2EBB8D4}" type="presParOf" srcId="{60DBA832-479C-1743-BECC-250F728DC167}" destId="{BBDD72CA-A800-3C4E-AEB9-7D8ED8099303}" srcOrd="2" destOrd="0" presId="urn:microsoft.com/office/officeart/2005/8/layout/hProcess3"/>
-    <dgm:cxn modelId="{9CE2A639-FA3E-264C-BA0D-14E7EDB2E61E}" type="presParOf" srcId="{60DBA832-479C-1743-BECC-250F728DC167}" destId="{E9BA63BF-45E1-5449-9720-DE3A782772B2}" srcOrd="3" destOrd="0" presId="urn:microsoft.com/office/officeart/2005/8/layout/hProcess3"/>
-    <dgm:cxn modelId="{462DDA9A-18D9-C643-82AF-238A81E94F5D}" type="presParOf" srcId="{03E188D3-1B92-D447-BC0F-BC0FAF8DE632}" destId="{955A1FE3-403C-7D4A-938F-538D7713FA80}" srcOrd="6" destOrd="0" presId="urn:microsoft.com/office/officeart/2005/8/layout/hProcess3"/>
-    <dgm:cxn modelId="{90CB2C3A-C603-5F4F-81AC-F37EA39B3991}" type="presParOf" srcId="{03E188D3-1B92-D447-BC0F-BC0FAF8DE632}" destId="{A0B8EE14-1712-C94B-AE50-7D4D17EA7AA6}" srcOrd="7" destOrd="0" presId="urn:microsoft.com/office/officeart/2005/8/layout/hProcess3"/>
-    <dgm:cxn modelId="{E9FAD117-B3B8-9E48-953B-678E437C3967}" type="presParOf" srcId="{03E188D3-1B92-D447-BC0F-BC0FAF8DE632}" destId="{D9443934-14F0-A045-AF4E-E1B40D04CB25}" srcOrd="8" destOrd="0" presId="urn:microsoft.com/office/officeart/2005/8/layout/hProcess3"/>
+    <dgm:cxn modelId="{979BAC48-2D84-324C-ADAE-7F53303F9870}" type="presOf" srcId="{93F285CF-03E6-AD4B-853E-A595FCAE3461}" destId="{A44B373F-200A-A449-9070-36D615C6E73F}" srcOrd="0" destOrd="0" presId="urn:microsoft.com/office/officeart/2005/8/layout/hProcess3"/>
+    <dgm:cxn modelId="{0FB33C48-94CD-BD49-97A5-ACEE47C6AD12}" type="presOf" srcId="{DF9BB8C1-1F1C-224E-A7B3-379786AD8D88}" destId="{E728272B-8270-384A-BDBE-2F1D493CE380}" srcOrd="0" destOrd="0" presId="urn:microsoft.com/office/officeart/2005/8/layout/hProcess3"/>
+    <dgm:cxn modelId="{F16BC454-0308-5F4D-97F4-3BF91A29B0BF}" type="presOf" srcId="{CDF87145-9BD6-AA43-A385-6B3FC8E2E595}" destId="{FD3E8E6F-A2FE-BA4D-9042-7E40F126C35D}" srcOrd="0" destOrd="0" presId="urn:microsoft.com/office/officeart/2005/8/layout/hProcess3"/>
+    <dgm:cxn modelId="{6F615AAE-E02C-3740-B6BB-179A8CB1BE4B}" type="presParOf" srcId="{C41437E7-93E2-4244-B5BB-0FB5398F019C}" destId="{7F2907E2-3063-1443-AB50-12B66C60971A}" srcOrd="0" destOrd="0" presId="urn:microsoft.com/office/officeart/2005/8/layout/hProcess3"/>
+    <dgm:cxn modelId="{5DBB1A51-8423-0148-BCBB-B935025D23B8}" type="presParOf" srcId="{C41437E7-93E2-4244-B5BB-0FB5398F019C}" destId="{03E188D3-1B92-D447-BC0F-BC0FAF8DE632}" srcOrd="1" destOrd="0" presId="urn:microsoft.com/office/officeart/2005/8/layout/hProcess3"/>
+    <dgm:cxn modelId="{330C2A82-F0DE-BC4A-8B3F-65C768ACDBDB}" type="presParOf" srcId="{03E188D3-1B92-D447-BC0F-BC0FAF8DE632}" destId="{05333B6A-9875-D448-B250-0C1A5B147700}" srcOrd="0" destOrd="0" presId="urn:microsoft.com/office/officeart/2005/8/layout/hProcess3"/>
+    <dgm:cxn modelId="{6108687A-77EA-744E-A743-3D0B29ADAC03}" type="presParOf" srcId="{03E188D3-1B92-D447-BC0F-BC0FAF8DE632}" destId="{C28D6342-D723-B649-AC00-0BF95E0A261C}" srcOrd="1" destOrd="0" presId="urn:microsoft.com/office/officeart/2005/8/layout/hProcess3"/>
+    <dgm:cxn modelId="{F5629D60-3BEA-BB4F-9CF7-C8F1AD125110}" type="presParOf" srcId="{C28D6342-D723-B649-AC00-0BF95E0A261C}" destId="{4715F7C2-FBCA-5E46-A880-7AE556CC1184}" srcOrd="0" destOrd="0" presId="urn:microsoft.com/office/officeart/2005/8/layout/hProcess3"/>
+    <dgm:cxn modelId="{7EB657EF-FEF2-6B4E-B78B-48D05C8F9D48}" type="presParOf" srcId="{C28D6342-D723-B649-AC00-0BF95E0A261C}" destId="{A44B373F-200A-A449-9070-36D615C6E73F}" srcOrd="1" destOrd="0" presId="urn:microsoft.com/office/officeart/2005/8/layout/hProcess3"/>
+    <dgm:cxn modelId="{91A666F1-6B1A-7F4A-A433-4DDE77BD2D27}" type="presParOf" srcId="{C28D6342-D723-B649-AC00-0BF95E0A261C}" destId="{1644EE96-CB53-4E47-A4D6-3E838BFEF211}" srcOrd="2" destOrd="0" presId="urn:microsoft.com/office/officeart/2005/8/layout/hProcess3"/>
+    <dgm:cxn modelId="{61C47102-EB9F-8544-ACE3-652CAD42734F}" type="presParOf" srcId="{C28D6342-D723-B649-AC00-0BF95E0A261C}" destId="{C1250A9D-0DDF-374D-B56B-F6622476C094}" srcOrd="3" destOrd="0" presId="urn:microsoft.com/office/officeart/2005/8/layout/hProcess3"/>
+    <dgm:cxn modelId="{32229FAE-7C40-EC43-A366-2284A4BE8058}" type="presParOf" srcId="{03E188D3-1B92-D447-BC0F-BC0FAF8DE632}" destId="{15B03E35-36EB-174B-BAB7-5B2867514C24}" srcOrd="2" destOrd="0" presId="urn:microsoft.com/office/officeart/2005/8/layout/hProcess3"/>
+    <dgm:cxn modelId="{82B34B9D-8F05-7942-9DDD-7E108AECB3F3}" type="presParOf" srcId="{03E188D3-1B92-D447-BC0F-BC0FAF8DE632}" destId="{E7CDCF20-C218-BD43-80FA-CBDB6D07A4D0}" srcOrd="3" destOrd="0" presId="urn:microsoft.com/office/officeart/2005/8/layout/hProcess3"/>
+    <dgm:cxn modelId="{2CDEA69D-20AA-1347-A776-8FABEF6AC764}" type="presParOf" srcId="{E7CDCF20-C218-BD43-80FA-CBDB6D07A4D0}" destId="{EFC2AC89-EE3A-F345-8BF3-DC263DDF0E67}" srcOrd="0" destOrd="0" presId="urn:microsoft.com/office/officeart/2005/8/layout/hProcess3"/>
+    <dgm:cxn modelId="{07A67983-DBB3-7C4D-8839-021A343D28D7}" type="presParOf" srcId="{E7CDCF20-C218-BD43-80FA-CBDB6D07A4D0}" destId="{E728272B-8270-384A-BDBE-2F1D493CE380}" srcOrd="1" destOrd="0" presId="urn:microsoft.com/office/officeart/2005/8/layout/hProcess3"/>
+    <dgm:cxn modelId="{63E4CF3A-B8A9-8F44-B0D0-8BF49D899514}" type="presParOf" srcId="{E7CDCF20-C218-BD43-80FA-CBDB6D07A4D0}" destId="{C1B6E88E-6B0E-9D4C-A945-B61814D7B3E4}" srcOrd="2" destOrd="0" presId="urn:microsoft.com/office/officeart/2005/8/layout/hProcess3"/>
+    <dgm:cxn modelId="{AB9995F2-3445-3940-8688-D2B3DF9FB2A2}" type="presParOf" srcId="{E7CDCF20-C218-BD43-80FA-CBDB6D07A4D0}" destId="{DA662F93-194F-254D-9B1A-70E4E25DF4F2}" srcOrd="3" destOrd="0" presId="urn:microsoft.com/office/officeart/2005/8/layout/hProcess3"/>
+    <dgm:cxn modelId="{A94EDC28-F11D-B348-8387-87992A8CE4D0}" type="presParOf" srcId="{03E188D3-1B92-D447-BC0F-BC0FAF8DE632}" destId="{C52DBBF3-07D9-8A43-A15E-39B020B7115B}" srcOrd="4" destOrd="0" presId="urn:microsoft.com/office/officeart/2005/8/layout/hProcess3"/>
+    <dgm:cxn modelId="{27D6CEAB-BC8B-F54C-AA06-7E727AF1C881}" type="presParOf" srcId="{03E188D3-1B92-D447-BC0F-BC0FAF8DE632}" destId="{60DBA832-479C-1743-BECC-250F728DC167}" srcOrd="5" destOrd="0" presId="urn:microsoft.com/office/officeart/2005/8/layout/hProcess3"/>
+    <dgm:cxn modelId="{039E82AF-CAB5-BA4F-8702-3EEBF79F9C48}" type="presParOf" srcId="{60DBA832-479C-1743-BECC-250F728DC167}" destId="{AB5EE344-C418-7C40-8127-F20F97FF7CB4}" srcOrd="0" destOrd="0" presId="urn:microsoft.com/office/officeart/2005/8/layout/hProcess3"/>
+    <dgm:cxn modelId="{8F4D2F79-2F1D-894E-8D4B-D8EF39488A93}" type="presParOf" srcId="{60DBA832-479C-1743-BECC-250F728DC167}" destId="{FD3E8E6F-A2FE-BA4D-9042-7E40F126C35D}" srcOrd="1" destOrd="0" presId="urn:microsoft.com/office/officeart/2005/8/layout/hProcess3"/>
+    <dgm:cxn modelId="{FAFF4110-BD06-5A40-808E-31D24472ED96}" type="presParOf" srcId="{60DBA832-479C-1743-BECC-250F728DC167}" destId="{BBDD72CA-A800-3C4E-AEB9-7D8ED8099303}" srcOrd="2" destOrd="0" presId="urn:microsoft.com/office/officeart/2005/8/layout/hProcess3"/>
+    <dgm:cxn modelId="{CAFFB57E-FA7A-FF41-8591-DCE0DFDB21FD}" type="presParOf" srcId="{60DBA832-479C-1743-BECC-250F728DC167}" destId="{E9BA63BF-45E1-5449-9720-DE3A782772B2}" srcOrd="3" destOrd="0" presId="urn:microsoft.com/office/officeart/2005/8/layout/hProcess3"/>
+    <dgm:cxn modelId="{85DEF900-CF90-0041-8C72-B020F86A1F46}" type="presParOf" srcId="{03E188D3-1B92-D447-BC0F-BC0FAF8DE632}" destId="{955A1FE3-403C-7D4A-938F-538D7713FA80}" srcOrd="6" destOrd="0" presId="urn:microsoft.com/office/officeart/2005/8/layout/hProcess3"/>
+    <dgm:cxn modelId="{75142022-5CAA-6644-B8DC-6A81D83EEFBE}" type="presParOf" srcId="{03E188D3-1B92-D447-BC0F-BC0FAF8DE632}" destId="{A0B8EE14-1712-C94B-AE50-7D4D17EA7AA6}" srcOrd="7" destOrd="0" presId="urn:microsoft.com/office/officeart/2005/8/layout/hProcess3"/>
+    <dgm:cxn modelId="{DEF45272-F57A-F342-B84A-01DD8EC06998}" type="presParOf" srcId="{03E188D3-1B92-D447-BC0F-BC0FAF8DE632}" destId="{D9443934-14F0-A045-AF4E-E1B40D04CB25}" srcOrd="8" destOrd="0" presId="urn:microsoft.com/office/officeart/2005/8/layout/hProcess3"/>
   </dgm:cxnLst>
   <dgm:bg/>
   <dgm:whole/>
@@ -2030,6 +2051,13 @@
         </dgm:presLayoutVars>
       </dgm:prSet>
       <dgm:spPr/>
+      <dgm:t>
+        <a:bodyPr/>
+        <a:lstStyle/>
+        <a:p>
+          <a:endParaRPr lang="en-US"/>
+        </a:p>
+      </dgm:t>
     </dgm:pt>
     <dgm:pt modelId="{1644EE96-CB53-4E47-A4D6-3E838BFEF211}" type="pres">
       <dgm:prSet presAssocID="{93F285CF-03E6-AD4B-853E-A595FCAE3461}" presName="spVertical2" presStyleCnt="0"/>
@@ -2060,6 +2088,13 @@
         </dgm:presLayoutVars>
       </dgm:prSet>
       <dgm:spPr/>
+      <dgm:t>
+        <a:bodyPr/>
+        <a:lstStyle/>
+        <a:p>
+          <a:endParaRPr lang="en-US"/>
+        </a:p>
+      </dgm:t>
     </dgm:pt>
     <dgm:pt modelId="{C1B6E88E-6B0E-9D4C-A945-B61814D7B3E4}" type="pres">
       <dgm:prSet presAssocID="{DF9BB8C1-1F1C-224E-A7B3-379786AD8D88}" presName="spVertical2" presStyleCnt="0"/>
@@ -2090,6 +2125,13 @@
         </dgm:presLayoutVars>
       </dgm:prSet>
       <dgm:spPr/>
+      <dgm:t>
+        <a:bodyPr/>
+        <a:lstStyle/>
+        <a:p>
+          <a:endParaRPr lang="en-US"/>
+        </a:p>
+      </dgm:t>
     </dgm:pt>
     <dgm:pt modelId="{BBDD72CA-A800-3C4E-AEB9-7D8ED8099303}" type="pres">
       <dgm:prSet presAssocID="{CDF87145-9BD6-AA43-A385-6B3FC8E2E595}" presName="spVertical2" presStyleCnt="0"/>
@@ -2115,34 +2157,34 @@
   <dgm:cxnLst>
     <dgm:cxn modelId="{2B7FC5DE-6462-3E46-8C90-CA5B36600B91}" srcId="{EF77BCA7-5424-DE49-B0AC-9945DDFA1F96}" destId="{DF9BB8C1-1F1C-224E-A7B3-379786AD8D88}" srcOrd="1" destOrd="0" parTransId="{D8681E15-33F3-894E-B538-902536B742AB}" sibTransId="{AD34FC3B-627D-7B45-8255-4705A2F94613}"/>
     <dgm:cxn modelId="{FFDAD881-9FCB-DC4F-9718-82BB75C984E6}" srcId="{EF77BCA7-5424-DE49-B0AC-9945DDFA1F96}" destId="{93F285CF-03E6-AD4B-853E-A595FCAE3461}" srcOrd="0" destOrd="0" parTransId="{B9EAAB2C-25B3-B544-8AD3-84F0188CE7EA}" sibTransId="{0E919826-9498-E84E-ADB9-D5C5DF3970D2}"/>
+    <dgm:cxn modelId="{37627FF2-139A-AB43-AB69-D1465EEF2507}" type="presOf" srcId="{CDF87145-9BD6-AA43-A385-6B3FC8E2E595}" destId="{FD3E8E6F-A2FE-BA4D-9042-7E40F126C35D}" srcOrd="0" destOrd="0" presId="urn:microsoft.com/office/officeart/2005/8/layout/hProcess3"/>
     <dgm:cxn modelId="{2EA4EB31-FFF7-2645-B9F7-90B822F3212D}" srcId="{EF77BCA7-5424-DE49-B0AC-9945DDFA1F96}" destId="{CDF87145-9BD6-AA43-A385-6B3FC8E2E595}" srcOrd="2" destOrd="0" parTransId="{23725B13-96A4-6841-8E75-66E248CACD60}" sibTransId="{69C37F7B-9BEC-9945-8567-D84A36F4C024}"/>
-    <dgm:cxn modelId="{5DFA15E3-6094-144F-AFD7-E70B1D60BD9E}" type="presOf" srcId="{93F285CF-03E6-AD4B-853E-A595FCAE3461}" destId="{A44B373F-200A-A449-9070-36D615C6E73F}" srcOrd="0" destOrd="0" presId="urn:microsoft.com/office/officeart/2005/8/layout/hProcess3"/>
-    <dgm:cxn modelId="{21DB4739-7530-6645-9907-86EE7C13B844}" type="presOf" srcId="{CDF87145-9BD6-AA43-A385-6B3FC8E2E595}" destId="{FD3E8E6F-A2FE-BA4D-9042-7E40F126C35D}" srcOrd="0" destOrd="0" presId="urn:microsoft.com/office/officeart/2005/8/layout/hProcess3"/>
-    <dgm:cxn modelId="{E17B1C59-3E63-CB46-BEE3-BB22FF42A966}" type="presOf" srcId="{EF77BCA7-5424-DE49-B0AC-9945DDFA1F96}" destId="{C41437E7-93E2-4244-B5BB-0FB5398F019C}" srcOrd="0" destOrd="0" presId="urn:microsoft.com/office/officeart/2005/8/layout/hProcess3"/>
-    <dgm:cxn modelId="{4AED8E5F-9695-1E4A-968F-D3EBB10190DB}" type="presOf" srcId="{DF9BB8C1-1F1C-224E-A7B3-379786AD8D88}" destId="{E728272B-8270-384A-BDBE-2F1D493CE380}" srcOrd="0" destOrd="0" presId="urn:microsoft.com/office/officeart/2005/8/layout/hProcess3"/>
-    <dgm:cxn modelId="{42B7CB80-AF45-CA4D-8B03-92ABFA47ADE0}" type="presParOf" srcId="{C41437E7-93E2-4244-B5BB-0FB5398F019C}" destId="{7F2907E2-3063-1443-AB50-12B66C60971A}" srcOrd="0" destOrd="0" presId="urn:microsoft.com/office/officeart/2005/8/layout/hProcess3"/>
-    <dgm:cxn modelId="{71000386-71DE-D343-A0A2-CB731790FF1B}" type="presParOf" srcId="{C41437E7-93E2-4244-B5BB-0FB5398F019C}" destId="{03E188D3-1B92-D447-BC0F-BC0FAF8DE632}" srcOrd="1" destOrd="0" presId="urn:microsoft.com/office/officeart/2005/8/layout/hProcess3"/>
-    <dgm:cxn modelId="{16193D68-B09C-0A4C-AB40-E195D02EEF0A}" type="presParOf" srcId="{03E188D3-1B92-D447-BC0F-BC0FAF8DE632}" destId="{05333B6A-9875-D448-B250-0C1A5B147700}" srcOrd="0" destOrd="0" presId="urn:microsoft.com/office/officeart/2005/8/layout/hProcess3"/>
-    <dgm:cxn modelId="{DE01F440-62E6-6541-9E75-F6A91F794D27}" type="presParOf" srcId="{03E188D3-1B92-D447-BC0F-BC0FAF8DE632}" destId="{C28D6342-D723-B649-AC00-0BF95E0A261C}" srcOrd="1" destOrd="0" presId="urn:microsoft.com/office/officeart/2005/8/layout/hProcess3"/>
-    <dgm:cxn modelId="{D34B7913-BAED-F843-B323-51F3F4281CB8}" type="presParOf" srcId="{C28D6342-D723-B649-AC00-0BF95E0A261C}" destId="{4715F7C2-FBCA-5E46-A880-7AE556CC1184}" srcOrd="0" destOrd="0" presId="urn:microsoft.com/office/officeart/2005/8/layout/hProcess3"/>
-    <dgm:cxn modelId="{17F4CC9D-9000-F24C-AC06-C9C52073E5BC}" type="presParOf" srcId="{C28D6342-D723-B649-AC00-0BF95E0A261C}" destId="{A44B373F-200A-A449-9070-36D615C6E73F}" srcOrd="1" destOrd="0" presId="urn:microsoft.com/office/officeart/2005/8/layout/hProcess3"/>
-    <dgm:cxn modelId="{9451E193-7D20-6144-8173-69A4FA965714}" type="presParOf" srcId="{C28D6342-D723-B649-AC00-0BF95E0A261C}" destId="{1644EE96-CB53-4E47-A4D6-3E838BFEF211}" srcOrd="2" destOrd="0" presId="urn:microsoft.com/office/officeart/2005/8/layout/hProcess3"/>
-    <dgm:cxn modelId="{0F81952A-4851-4847-99C2-F27FE3B2B3EB}" type="presParOf" srcId="{C28D6342-D723-B649-AC00-0BF95E0A261C}" destId="{C1250A9D-0DDF-374D-B56B-F6622476C094}" srcOrd="3" destOrd="0" presId="urn:microsoft.com/office/officeart/2005/8/layout/hProcess3"/>
-    <dgm:cxn modelId="{E047B8D5-0FB3-2949-9638-14B7514BC8C5}" type="presParOf" srcId="{03E188D3-1B92-D447-BC0F-BC0FAF8DE632}" destId="{15B03E35-36EB-174B-BAB7-5B2867514C24}" srcOrd="2" destOrd="0" presId="urn:microsoft.com/office/officeart/2005/8/layout/hProcess3"/>
-    <dgm:cxn modelId="{9D008A6F-CC30-5646-9E92-0A8D960086DA}" type="presParOf" srcId="{03E188D3-1B92-D447-BC0F-BC0FAF8DE632}" destId="{E7CDCF20-C218-BD43-80FA-CBDB6D07A4D0}" srcOrd="3" destOrd="0" presId="urn:microsoft.com/office/officeart/2005/8/layout/hProcess3"/>
-    <dgm:cxn modelId="{C926E281-48CA-844C-BAF3-C2D88DB81AE0}" type="presParOf" srcId="{E7CDCF20-C218-BD43-80FA-CBDB6D07A4D0}" destId="{EFC2AC89-EE3A-F345-8BF3-DC263DDF0E67}" srcOrd="0" destOrd="0" presId="urn:microsoft.com/office/officeart/2005/8/layout/hProcess3"/>
-    <dgm:cxn modelId="{4808554A-CE75-E44D-B42C-EB66AFBBED9D}" type="presParOf" srcId="{E7CDCF20-C218-BD43-80FA-CBDB6D07A4D0}" destId="{E728272B-8270-384A-BDBE-2F1D493CE380}" srcOrd="1" destOrd="0" presId="urn:microsoft.com/office/officeart/2005/8/layout/hProcess3"/>
-    <dgm:cxn modelId="{820E61AB-3007-094E-9DDA-6A3E981962D0}" type="presParOf" srcId="{E7CDCF20-C218-BD43-80FA-CBDB6D07A4D0}" destId="{C1B6E88E-6B0E-9D4C-A945-B61814D7B3E4}" srcOrd="2" destOrd="0" presId="urn:microsoft.com/office/officeart/2005/8/layout/hProcess3"/>
-    <dgm:cxn modelId="{C15A57DD-2E38-5843-9A37-33F000EB6105}" type="presParOf" srcId="{E7CDCF20-C218-BD43-80FA-CBDB6D07A4D0}" destId="{DA662F93-194F-254D-9B1A-70E4E25DF4F2}" srcOrd="3" destOrd="0" presId="urn:microsoft.com/office/officeart/2005/8/layout/hProcess3"/>
-    <dgm:cxn modelId="{8D926C0B-BDCD-6440-9D1A-671EF2DBDE89}" type="presParOf" srcId="{03E188D3-1B92-D447-BC0F-BC0FAF8DE632}" destId="{C52DBBF3-07D9-8A43-A15E-39B020B7115B}" srcOrd="4" destOrd="0" presId="urn:microsoft.com/office/officeart/2005/8/layout/hProcess3"/>
-    <dgm:cxn modelId="{CE7A56E1-9D4C-1946-8A3A-FE68FF3D6450}" type="presParOf" srcId="{03E188D3-1B92-D447-BC0F-BC0FAF8DE632}" destId="{60DBA832-479C-1743-BECC-250F728DC167}" srcOrd="5" destOrd="0" presId="urn:microsoft.com/office/officeart/2005/8/layout/hProcess3"/>
-    <dgm:cxn modelId="{A18FD6B1-F2BD-1541-9EE6-003C2D7EC329}" type="presParOf" srcId="{60DBA832-479C-1743-BECC-250F728DC167}" destId="{AB5EE344-C418-7C40-8127-F20F97FF7CB4}" srcOrd="0" destOrd="0" presId="urn:microsoft.com/office/officeart/2005/8/layout/hProcess3"/>
-    <dgm:cxn modelId="{65EB511F-4CB7-E446-A513-739F60E928CD}" type="presParOf" srcId="{60DBA832-479C-1743-BECC-250F728DC167}" destId="{FD3E8E6F-A2FE-BA4D-9042-7E40F126C35D}" srcOrd="1" destOrd="0" presId="urn:microsoft.com/office/officeart/2005/8/layout/hProcess3"/>
-    <dgm:cxn modelId="{FC0B66FB-5DA2-B642-9BE3-AFBAFA16D97D}" type="presParOf" srcId="{60DBA832-479C-1743-BECC-250F728DC167}" destId="{BBDD72CA-A800-3C4E-AEB9-7D8ED8099303}" srcOrd="2" destOrd="0" presId="urn:microsoft.com/office/officeart/2005/8/layout/hProcess3"/>
-    <dgm:cxn modelId="{191ADD5E-3031-534F-AEEE-32DCF9979484}" type="presParOf" srcId="{60DBA832-479C-1743-BECC-250F728DC167}" destId="{E9BA63BF-45E1-5449-9720-DE3A782772B2}" srcOrd="3" destOrd="0" presId="urn:microsoft.com/office/officeart/2005/8/layout/hProcess3"/>
-    <dgm:cxn modelId="{C2E6E6EC-C5DD-0B4B-8E75-8775721C0303}" type="presParOf" srcId="{03E188D3-1B92-D447-BC0F-BC0FAF8DE632}" destId="{955A1FE3-403C-7D4A-938F-538D7713FA80}" srcOrd="6" destOrd="0" presId="urn:microsoft.com/office/officeart/2005/8/layout/hProcess3"/>
-    <dgm:cxn modelId="{791C9D6C-F5E2-AA4F-8093-E9209BFDA521}" type="presParOf" srcId="{03E188D3-1B92-D447-BC0F-BC0FAF8DE632}" destId="{A0B8EE14-1712-C94B-AE50-7D4D17EA7AA6}" srcOrd="7" destOrd="0" presId="urn:microsoft.com/office/officeart/2005/8/layout/hProcess3"/>
-    <dgm:cxn modelId="{556D1F86-9CCC-E442-87FB-C7CDA40ED8BD}" type="presParOf" srcId="{03E188D3-1B92-D447-BC0F-BC0FAF8DE632}" destId="{D9443934-14F0-A045-AF4E-E1B40D04CB25}" srcOrd="8" destOrd="0" presId="urn:microsoft.com/office/officeart/2005/8/layout/hProcess3"/>
+    <dgm:cxn modelId="{1E8C318D-8997-B84B-AE31-2F594080F6D7}" type="presOf" srcId="{EF77BCA7-5424-DE49-B0AC-9945DDFA1F96}" destId="{C41437E7-93E2-4244-B5BB-0FB5398F019C}" srcOrd="0" destOrd="0" presId="urn:microsoft.com/office/officeart/2005/8/layout/hProcess3"/>
+    <dgm:cxn modelId="{E9059D37-EF79-974B-A889-424E1864869C}" type="presOf" srcId="{93F285CF-03E6-AD4B-853E-A595FCAE3461}" destId="{A44B373F-200A-A449-9070-36D615C6E73F}" srcOrd="0" destOrd="0" presId="urn:microsoft.com/office/officeart/2005/8/layout/hProcess3"/>
+    <dgm:cxn modelId="{12117880-969C-4F45-8F92-AA062225B70E}" type="presOf" srcId="{DF9BB8C1-1F1C-224E-A7B3-379786AD8D88}" destId="{E728272B-8270-384A-BDBE-2F1D493CE380}" srcOrd="0" destOrd="0" presId="urn:microsoft.com/office/officeart/2005/8/layout/hProcess3"/>
+    <dgm:cxn modelId="{B30C95D5-E055-8D45-A128-BC1DF163F15C}" type="presParOf" srcId="{C41437E7-93E2-4244-B5BB-0FB5398F019C}" destId="{7F2907E2-3063-1443-AB50-12B66C60971A}" srcOrd="0" destOrd="0" presId="urn:microsoft.com/office/officeart/2005/8/layout/hProcess3"/>
+    <dgm:cxn modelId="{9D0FE283-427C-6946-B0F6-2CC3C2C6C6C0}" type="presParOf" srcId="{C41437E7-93E2-4244-B5BB-0FB5398F019C}" destId="{03E188D3-1B92-D447-BC0F-BC0FAF8DE632}" srcOrd="1" destOrd="0" presId="urn:microsoft.com/office/officeart/2005/8/layout/hProcess3"/>
+    <dgm:cxn modelId="{9E60B036-D223-5B45-9305-92ABB8678752}" type="presParOf" srcId="{03E188D3-1B92-D447-BC0F-BC0FAF8DE632}" destId="{05333B6A-9875-D448-B250-0C1A5B147700}" srcOrd="0" destOrd="0" presId="urn:microsoft.com/office/officeart/2005/8/layout/hProcess3"/>
+    <dgm:cxn modelId="{AA052A7E-E795-724F-B57B-2556DB95EA2A}" type="presParOf" srcId="{03E188D3-1B92-D447-BC0F-BC0FAF8DE632}" destId="{C28D6342-D723-B649-AC00-0BF95E0A261C}" srcOrd="1" destOrd="0" presId="urn:microsoft.com/office/officeart/2005/8/layout/hProcess3"/>
+    <dgm:cxn modelId="{188213BC-793F-AC44-A597-5AFDABFBF301}" type="presParOf" srcId="{C28D6342-D723-B649-AC00-0BF95E0A261C}" destId="{4715F7C2-FBCA-5E46-A880-7AE556CC1184}" srcOrd="0" destOrd="0" presId="urn:microsoft.com/office/officeart/2005/8/layout/hProcess3"/>
+    <dgm:cxn modelId="{B9039606-A6A7-B54C-BAAE-114811C8C192}" type="presParOf" srcId="{C28D6342-D723-B649-AC00-0BF95E0A261C}" destId="{A44B373F-200A-A449-9070-36D615C6E73F}" srcOrd="1" destOrd="0" presId="urn:microsoft.com/office/officeart/2005/8/layout/hProcess3"/>
+    <dgm:cxn modelId="{D12E4A05-D0DD-8A40-8A51-BA645F5B6E7E}" type="presParOf" srcId="{C28D6342-D723-B649-AC00-0BF95E0A261C}" destId="{1644EE96-CB53-4E47-A4D6-3E838BFEF211}" srcOrd="2" destOrd="0" presId="urn:microsoft.com/office/officeart/2005/8/layout/hProcess3"/>
+    <dgm:cxn modelId="{B3145032-E6D4-CF4F-B8AC-4DCBABA2F0F7}" type="presParOf" srcId="{C28D6342-D723-B649-AC00-0BF95E0A261C}" destId="{C1250A9D-0DDF-374D-B56B-F6622476C094}" srcOrd="3" destOrd="0" presId="urn:microsoft.com/office/officeart/2005/8/layout/hProcess3"/>
+    <dgm:cxn modelId="{33292BB7-5E94-4D4C-9B57-BC314211C544}" type="presParOf" srcId="{03E188D3-1B92-D447-BC0F-BC0FAF8DE632}" destId="{15B03E35-36EB-174B-BAB7-5B2867514C24}" srcOrd="2" destOrd="0" presId="urn:microsoft.com/office/officeart/2005/8/layout/hProcess3"/>
+    <dgm:cxn modelId="{08C51235-25F3-794C-9A29-218FBB2653AB}" type="presParOf" srcId="{03E188D3-1B92-D447-BC0F-BC0FAF8DE632}" destId="{E7CDCF20-C218-BD43-80FA-CBDB6D07A4D0}" srcOrd="3" destOrd="0" presId="urn:microsoft.com/office/officeart/2005/8/layout/hProcess3"/>
+    <dgm:cxn modelId="{FA391BDC-F084-604E-8BD3-6011B8737E84}" type="presParOf" srcId="{E7CDCF20-C218-BD43-80FA-CBDB6D07A4D0}" destId="{EFC2AC89-EE3A-F345-8BF3-DC263DDF0E67}" srcOrd="0" destOrd="0" presId="urn:microsoft.com/office/officeart/2005/8/layout/hProcess3"/>
+    <dgm:cxn modelId="{F223DFC7-3664-1D48-B3BD-B395521E0E6F}" type="presParOf" srcId="{E7CDCF20-C218-BD43-80FA-CBDB6D07A4D0}" destId="{E728272B-8270-384A-BDBE-2F1D493CE380}" srcOrd="1" destOrd="0" presId="urn:microsoft.com/office/officeart/2005/8/layout/hProcess3"/>
+    <dgm:cxn modelId="{4578A38F-3D67-5A47-AB8A-6207D306917E}" type="presParOf" srcId="{E7CDCF20-C218-BD43-80FA-CBDB6D07A4D0}" destId="{C1B6E88E-6B0E-9D4C-A945-B61814D7B3E4}" srcOrd="2" destOrd="0" presId="urn:microsoft.com/office/officeart/2005/8/layout/hProcess3"/>
+    <dgm:cxn modelId="{EC9D3792-57D5-D54E-B80B-FD9E80E577F0}" type="presParOf" srcId="{E7CDCF20-C218-BD43-80FA-CBDB6D07A4D0}" destId="{DA662F93-194F-254D-9B1A-70E4E25DF4F2}" srcOrd="3" destOrd="0" presId="urn:microsoft.com/office/officeart/2005/8/layout/hProcess3"/>
+    <dgm:cxn modelId="{71F78DBC-1461-6D4E-BE61-628CC48F80E5}" type="presParOf" srcId="{03E188D3-1B92-D447-BC0F-BC0FAF8DE632}" destId="{C52DBBF3-07D9-8A43-A15E-39B020B7115B}" srcOrd="4" destOrd="0" presId="urn:microsoft.com/office/officeart/2005/8/layout/hProcess3"/>
+    <dgm:cxn modelId="{19A5D791-0160-EE4E-90B1-E59B6FC5AE80}" type="presParOf" srcId="{03E188D3-1B92-D447-BC0F-BC0FAF8DE632}" destId="{60DBA832-479C-1743-BECC-250F728DC167}" srcOrd="5" destOrd="0" presId="urn:microsoft.com/office/officeart/2005/8/layout/hProcess3"/>
+    <dgm:cxn modelId="{8222C69F-C689-B447-AA4D-5DFCFB54BF1E}" type="presParOf" srcId="{60DBA832-479C-1743-BECC-250F728DC167}" destId="{AB5EE344-C418-7C40-8127-F20F97FF7CB4}" srcOrd="0" destOrd="0" presId="urn:microsoft.com/office/officeart/2005/8/layout/hProcess3"/>
+    <dgm:cxn modelId="{9BB26805-A7C3-5142-80EC-B495869A2C65}" type="presParOf" srcId="{60DBA832-479C-1743-BECC-250F728DC167}" destId="{FD3E8E6F-A2FE-BA4D-9042-7E40F126C35D}" srcOrd="1" destOrd="0" presId="urn:microsoft.com/office/officeart/2005/8/layout/hProcess3"/>
+    <dgm:cxn modelId="{3D52588B-617A-E84B-84A5-A90BB99644C6}" type="presParOf" srcId="{60DBA832-479C-1743-BECC-250F728DC167}" destId="{BBDD72CA-A800-3C4E-AEB9-7D8ED8099303}" srcOrd="2" destOrd="0" presId="urn:microsoft.com/office/officeart/2005/8/layout/hProcess3"/>
+    <dgm:cxn modelId="{54EE1D7B-41E5-674D-819D-64311F340B94}" type="presParOf" srcId="{60DBA832-479C-1743-BECC-250F728DC167}" destId="{E9BA63BF-45E1-5449-9720-DE3A782772B2}" srcOrd="3" destOrd="0" presId="urn:microsoft.com/office/officeart/2005/8/layout/hProcess3"/>
+    <dgm:cxn modelId="{A572848C-5015-A741-9389-AEA0C45E3B43}" type="presParOf" srcId="{03E188D3-1B92-D447-BC0F-BC0FAF8DE632}" destId="{955A1FE3-403C-7D4A-938F-538D7713FA80}" srcOrd="6" destOrd="0" presId="urn:microsoft.com/office/officeart/2005/8/layout/hProcess3"/>
+    <dgm:cxn modelId="{2757349C-C16B-6E4B-8B03-9497D9DCCAE9}" type="presParOf" srcId="{03E188D3-1B92-D447-BC0F-BC0FAF8DE632}" destId="{A0B8EE14-1712-C94B-AE50-7D4D17EA7AA6}" srcOrd="7" destOrd="0" presId="urn:microsoft.com/office/officeart/2005/8/layout/hProcess3"/>
+    <dgm:cxn modelId="{48D28715-F32B-2940-9085-A21AAE791707}" type="presParOf" srcId="{03E188D3-1B92-D447-BC0F-BC0FAF8DE632}" destId="{D9443934-14F0-A045-AF4E-E1B40D04CB25}" srcOrd="8" destOrd="0" presId="urn:microsoft.com/office/officeart/2005/8/layout/hProcess3"/>
   </dgm:cxnLst>
   <dgm:bg/>
   <dgm:whole/>
@@ -8712,6 +8754,13 @@
   <p:clrMapOvr>
     <a:masterClrMapping/>
   </p:clrMapOvr>
+  <p:timing>
+    <p:tnLst>
+      <p:par>
+        <p:cTn id="1" dur="indefinite" restart="never" nodeType="tmRoot"/>
+      </p:par>
+    </p:tnLst>
+  </p:timing>
 </p:sld>
 </file>
 
@@ -8778,6 +8827,13 @@
   <p:clrMapOvr>
     <a:masterClrMapping/>
   </p:clrMapOvr>
+  <p:timing>
+    <p:tnLst>
+      <p:par>
+        <p:cTn id="1" dur="indefinite" restart="never" nodeType="tmRoot"/>
+      </p:par>
+    </p:tnLst>
+  </p:timing>
 </p:sld>
 </file>
 
@@ -9235,6 +9291,13 @@
   <p:clrMapOvr>
     <a:masterClrMapping/>
   </p:clrMapOvr>
+  <p:timing>
+    <p:tnLst>
+      <p:par>
+        <p:cTn id="1" dur="indefinite" restart="never" nodeType="tmRoot"/>
+      </p:par>
+    </p:tnLst>
+  </p:timing>
 </p:sld>
 </file>
 
@@ -9816,11 +9879,11 @@
             </a:r>
             <a:r>
               <a:rPr lang="en-US" sz="2000" smtClean="0"/>
-              <a:t>(</a:t>
+              <a:t>(“</a:t>
             </a:r>
             <a:r>
               <a:rPr lang="en-US" sz="2000"/>
-              <a:t>Framework for Agent-based MOdeling with Java</a:t>
+              <a:t>Framework for Agent-based MOdeling with Java”</a:t>
             </a:r>
             <a:r>
               <a:rPr lang="en-US" sz="2000" smtClean="0"/>
@@ -10048,6 +10111,13 @@
   <p:clrMapOvr>
     <a:masterClrMapping/>
   </p:clrMapOvr>
+  <p:timing>
+    <p:tnLst>
+      <p:par>
+        <p:cTn id="1" dur="indefinite" restart="never" nodeType="tmRoot"/>
+      </p:par>
+    </p:tnLst>
+  </p:timing>
 </p:sld>
 </file>
 
@@ -10746,7 +10816,6 @@
               <a:rPr lang="de-DE"/>
               <a:t>genügend Zucker hat</a:t>
             </a:r>
-            <a:endParaRPr lang="de-DE"/>
           </a:p>
           <a:p>
             <a:pPr lvl="2"/>
@@ -10775,7 +10844,6 @@
               <a:rPr lang="de-DE"/>
               <a:t>Der Zucker bis zu einem bestimmten Betrag abgebaut ist</a:t>
             </a:r>
-            <a:endParaRPr lang="de-DE"/>
           </a:p>
           <a:p>
             <a:pPr lvl="2"/>
@@ -10783,7 +10851,6 @@
               <a:rPr lang="de-DE"/>
               <a:t>Dann</a:t>
             </a:r>
-            <a:endParaRPr lang="de-DE"/>
           </a:p>
           <a:p>
             <a:pPr lvl="3"/>
@@ -10798,7 +10865,6 @@
               <a:rPr lang="de-DE"/>
               <a:t>Bewege dich dorthin</a:t>
             </a:r>
-            <a:endParaRPr lang="de-DE"/>
           </a:p>
           <a:p>
             <a:pPr lvl="2"/>
@@ -10813,7 +10879,6 @@
               <a:rPr lang="de-DE"/>
               <a:t>Gehe vor wie bei „Ohne aktive Suche nach einem Partner“</a:t>
             </a:r>
-            <a:endParaRPr lang="de-DE"/>
           </a:p>
           <a:p>
             <a:pPr lvl="3"/>
@@ -11081,9 +11146,265 @@
   <p:timing>
     <p:tnLst>
       <p:par>
-        <p:cTn id="1" dur="indefinite" restart="never" nodeType="tmRoot"/>
+        <p:cTn id="1" dur="indefinite" restart="never" nodeType="tmRoot">
+          <p:childTnLst>
+            <p:seq concurrent="1" nextAc="seek">
+              <p:cTn id="2" dur="indefinite" nodeType="mainSeq">
+                <p:childTnLst>
+                  <p:par>
+                    <p:cTn id="3" fill="hold">
+                      <p:stCondLst>
+                        <p:cond delay="indefinite"/>
+                      </p:stCondLst>
+                      <p:childTnLst>
+                        <p:par>
+                          <p:cTn id="4" fill="hold">
+                            <p:stCondLst>
+                              <p:cond delay="0"/>
+                            </p:stCondLst>
+                            <p:childTnLst>
+                              <p:par>
+                                <p:cTn id="5" presetID="1" presetClass="entr" presetSubtype="0" fill="hold" nodeType="clickEffect">
+                                  <p:stCondLst>
+                                    <p:cond delay="0"/>
+                                  </p:stCondLst>
+                                  <p:childTnLst>
+                                    <p:set>
+                                      <p:cBhvr>
+                                        <p:cTn id="6" dur="1" fill="hold">
+                                          <p:stCondLst>
+                                            <p:cond delay="0"/>
+                                          </p:stCondLst>
+                                        </p:cTn>
+                                        <p:tgtEl>
+                                          <p:spTgt spid="4"/>
+                                        </p:tgtEl>
+                                        <p:attrNameLst>
+                                          <p:attrName>style.visibility</p:attrName>
+                                        </p:attrNameLst>
+                                      </p:cBhvr>
+                                      <p:to>
+                                        <p:strVal val="visible"/>
+                                      </p:to>
+                                    </p:set>
+                                  </p:childTnLst>
+                                </p:cTn>
+                              </p:par>
+                            </p:childTnLst>
+                          </p:cTn>
+                        </p:par>
+                      </p:childTnLst>
+                    </p:cTn>
+                  </p:par>
+                  <p:par>
+                    <p:cTn id="7" fill="hold">
+                      <p:stCondLst>
+                        <p:cond delay="indefinite"/>
+                      </p:stCondLst>
+                      <p:childTnLst>
+                        <p:par>
+                          <p:cTn id="8" fill="hold">
+                            <p:stCondLst>
+                              <p:cond delay="0"/>
+                            </p:stCondLst>
+                            <p:childTnLst>
+                              <p:par>
+                                <p:cTn id="9" presetID="1" presetClass="entr" presetSubtype="0" fill="hold" grpId="0" nodeType="clickEffect">
+                                  <p:stCondLst>
+                                    <p:cond delay="0"/>
+                                  </p:stCondLst>
+                                  <p:childTnLst>
+                                    <p:set>
+                                      <p:cBhvr>
+                                        <p:cTn id="10" dur="1" fill="hold">
+                                          <p:stCondLst>
+                                            <p:cond delay="0"/>
+                                          </p:stCondLst>
+                                        </p:cTn>
+                                        <p:tgtEl>
+                                          <p:spTgt spid="7"/>
+                                        </p:tgtEl>
+                                        <p:attrNameLst>
+                                          <p:attrName>style.visibility</p:attrName>
+                                        </p:attrNameLst>
+                                      </p:cBhvr>
+                                      <p:to>
+                                        <p:strVal val="visible"/>
+                                      </p:to>
+                                    </p:set>
+                                  </p:childTnLst>
+                                </p:cTn>
+                              </p:par>
+                            </p:childTnLst>
+                          </p:cTn>
+                        </p:par>
+                      </p:childTnLst>
+                    </p:cTn>
+                  </p:par>
+                  <p:par>
+                    <p:cTn id="11" fill="hold">
+                      <p:stCondLst>
+                        <p:cond delay="indefinite"/>
+                      </p:stCondLst>
+                      <p:childTnLst>
+                        <p:par>
+                          <p:cTn id="12" fill="hold">
+                            <p:stCondLst>
+                              <p:cond delay="0"/>
+                            </p:stCondLst>
+                            <p:childTnLst>
+                              <p:par>
+                                <p:cTn id="13" presetID="1" presetClass="entr" presetSubtype="0" fill="hold" nodeType="clickEffect">
+                                  <p:stCondLst>
+                                    <p:cond delay="0"/>
+                                  </p:stCondLst>
+                                  <p:childTnLst>
+                                    <p:set>
+                                      <p:cBhvr>
+                                        <p:cTn id="14" dur="1" fill="hold">
+                                          <p:stCondLst>
+                                            <p:cond delay="0"/>
+                                          </p:stCondLst>
+                                        </p:cTn>
+                                        <p:tgtEl>
+                                          <p:spTgt spid="5"/>
+                                        </p:tgtEl>
+                                        <p:attrNameLst>
+                                          <p:attrName>style.visibility</p:attrName>
+                                        </p:attrNameLst>
+                                      </p:cBhvr>
+                                      <p:to>
+                                        <p:strVal val="visible"/>
+                                      </p:to>
+                                    </p:set>
+                                  </p:childTnLst>
+                                </p:cTn>
+                              </p:par>
+                            </p:childTnLst>
+                          </p:cTn>
+                        </p:par>
+                      </p:childTnLst>
+                    </p:cTn>
+                  </p:par>
+                  <p:par>
+                    <p:cTn id="15" fill="hold">
+                      <p:stCondLst>
+                        <p:cond delay="indefinite"/>
+                      </p:stCondLst>
+                      <p:childTnLst>
+                        <p:par>
+                          <p:cTn id="16" fill="hold">
+                            <p:stCondLst>
+                              <p:cond delay="0"/>
+                            </p:stCondLst>
+                            <p:childTnLst>
+                              <p:par>
+                                <p:cTn id="17" presetID="1" presetClass="entr" presetSubtype="0" fill="hold" grpId="0" nodeType="clickEffect">
+                                  <p:stCondLst>
+                                    <p:cond delay="0"/>
+                                  </p:stCondLst>
+                                  <p:childTnLst>
+                                    <p:set>
+                                      <p:cBhvr>
+                                        <p:cTn id="18" dur="1" fill="hold">
+                                          <p:stCondLst>
+                                            <p:cond delay="0"/>
+                                          </p:stCondLst>
+                                        </p:cTn>
+                                        <p:tgtEl>
+                                          <p:spTgt spid="9"/>
+                                        </p:tgtEl>
+                                        <p:attrNameLst>
+                                          <p:attrName>style.visibility</p:attrName>
+                                        </p:attrNameLst>
+                                      </p:cBhvr>
+                                      <p:to>
+                                        <p:strVal val="visible"/>
+                                      </p:to>
+                                    </p:set>
+                                  </p:childTnLst>
+                                </p:cTn>
+                              </p:par>
+                            </p:childTnLst>
+                          </p:cTn>
+                        </p:par>
+                      </p:childTnLst>
+                    </p:cTn>
+                  </p:par>
+                  <p:par>
+                    <p:cTn id="19" fill="hold">
+                      <p:stCondLst>
+                        <p:cond delay="indefinite"/>
+                      </p:stCondLst>
+                      <p:childTnLst>
+                        <p:par>
+                          <p:cTn id="20" fill="hold">
+                            <p:stCondLst>
+                              <p:cond delay="0"/>
+                            </p:stCondLst>
+                            <p:childTnLst>
+                              <p:par>
+                                <p:cTn id="21" presetID="1" presetClass="entr" presetSubtype="0" fill="hold" nodeType="clickEffect">
+                                  <p:stCondLst>
+                                    <p:cond delay="0"/>
+                                  </p:stCondLst>
+                                  <p:childTnLst>
+                                    <p:set>
+                                      <p:cBhvr>
+                                        <p:cTn id="22" dur="1" fill="hold">
+                                          <p:stCondLst>
+                                            <p:cond delay="0"/>
+                                          </p:stCondLst>
+                                        </p:cTn>
+                                        <p:tgtEl>
+                                          <p:spTgt spid="6"/>
+                                        </p:tgtEl>
+                                        <p:attrNameLst>
+                                          <p:attrName>style.visibility</p:attrName>
+                                        </p:attrNameLst>
+                                      </p:cBhvr>
+                                      <p:to>
+                                        <p:strVal val="visible"/>
+                                      </p:to>
+                                    </p:set>
+                                  </p:childTnLst>
+                                </p:cTn>
+                              </p:par>
+                            </p:childTnLst>
+                          </p:cTn>
+                        </p:par>
+                      </p:childTnLst>
+                    </p:cTn>
+                  </p:par>
+                </p:childTnLst>
+              </p:cTn>
+              <p:prevCondLst>
+                <p:cond evt="onPrev" delay="0">
+                  <p:tgtEl>
+                    <p:sldTgt/>
+                  </p:tgtEl>
+                </p:cond>
+              </p:prevCondLst>
+              <p:nextCondLst>
+                <p:cond evt="onNext" delay="0">
+                  <p:tgtEl>
+                    <p:sldTgt/>
+                  </p:tgtEl>
+                </p:cond>
+              </p:nextCondLst>
+            </p:seq>
+          </p:childTnLst>
+        </p:cTn>
       </p:par>
     </p:tnLst>
+    <p:bldLst>
+      <p:bldGraphic spid="7" grpId="0">
+        <p:bldAsOne/>
+      </p:bldGraphic>
+      <p:bldGraphic spid="9" grpId="0">
+        <p:bldAsOne/>
+      </p:bldGraphic>
+    </p:bldLst>
   </p:timing>
 </p:sld>
 </file>

</xml_diff>